<commit_message>
Aggiornamento testo nella textbox del titolo
</commit_message>
<xml_diff>
--- a/Solution/PptGeneratorGUI/Configurazione/PowerPoint_Template.pptx
+++ b/Solution/PptGeneratorGUI/Configurazione/PowerPoint_Template.pptx
@@ -4797,7 +4797,7 @@
           <a:graphicData uri="http://schemas.openxmlformats.org/presentationml/2006/ole">
             <mc:AlternateContent xmlns:mc="http://schemas.openxmlformats.org/markup-compatibility/2006">
               <mc:Choice xmlns:v="urn:schemas-microsoft-com:vml" Requires="v">
-                <p:oleObj spid="_x0000_s5125" name="Diapositiva think-cell" r:id="rId4" imgW="270" imgH="270" progId="TCLayout.ActiveDocument.1">
+                <p:oleObj spid="_x0000_s5126" name="Diapositiva think-cell" r:id="rId4" imgW="270" imgH="270" progId="TCLayout.ActiveDocument.1">
                   <p:embed/>
                 </p:oleObj>
               </mc:Choice>
@@ -7323,7 +7323,7 @@
           <a:graphicData uri="http://schemas.openxmlformats.org/presentationml/2006/ole">
             <mc:AlternateContent xmlns:mc="http://schemas.openxmlformats.org/markup-compatibility/2006">
               <mc:Choice xmlns:v="urn:schemas-microsoft-com:vml" Requires="v">
-                <p:oleObj spid="_x0000_s4101" name="Diapositiva think-cell" r:id="rId4" imgW="270" imgH="270" progId="TCLayout.ActiveDocument.1">
+                <p:oleObj spid="_x0000_s4102" name="Diapositiva think-cell" r:id="rId4" imgW="270" imgH="270" progId="TCLayout.ActiveDocument.1">
                   <p:embed/>
                 </p:oleObj>
               </mc:Choice>
@@ -8836,7 +8836,7 @@
           <p:cNvPr id="2" name="Oggetto 1" hidden="1">
             <a:extLst>
               <a:ext uri="{FF2B5EF4-FFF2-40B4-BE49-F238E27FC236}">
-                <a16:creationId xmlns="" xmlns:a16="http://schemas.microsoft.com/office/drawing/2014/main" id="{806360A6-C612-49A8-98A1-B1A844B18FE4}"/>
+                <a16:creationId xmlns:a16="http://schemas.microsoft.com/office/drawing/2014/main" xmlns="" id="{806360A6-C612-49A8-98A1-B1A844B18FE4}"/>
               </a:ext>
             </a:extLst>
           </p:cNvPr>
@@ -8862,7 +8862,7 @@
           <a:graphicData uri="http://schemas.openxmlformats.org/presentationml/2006/ole">
             <mc:AlternateContent xmlns:mc="http://schemas.openxmlformats.org/markup-compatibility/2006">
               <mc:Choice xmlns:v="urn:schemas-microsoft-com:vml" Requires="v">
-                <p:oleObj spid="_x0000_s1029" name="Diapositiva think-cell" r:id="rId5" imgW="270" imgH="270" progId="TCLayout.ActiveDocument.1">
+                <p:oleObj spid="_x0000_s1030" name="Diapositiva think-cell" r:id="rId5" imgW="270" imgH="270" progId="TCLayout.ActiveDocument.1">
                   <p:embed/>
                 </p:oleObj>
               </mc:Choice>
@@ -9273,7 +9273,7 @@
           <p:cNvPr id="5" name="Oggetto 4" hidden="1">
             <a:extLst>
               <a:ext uri="{FF2B5EF4-FFF2-40B4-BE49-F238E27FC236}">
-                <a16:creationId xmlns="" xmlns:a16="http://schemas.microsoft.com/office/drawing/2014/main" id="{9322E714-FBEE-4145-8597-9978C4C42D40}"/>
+                <a16:creationId xmlns:a16="http://schemas.microsoft.com/office/drawing/2014/main" xmlns="" id="{9322E714-FBEE-4145-8597-9978C4C42D40}"/>
               </a:ext>
             </a:extLst>
           </p:cNvPr>
@@ -9299,7 +9299,7 @@
           <a:graphicData uri="http://schemas.openxmlformats.org/presentationml/2006/ole">
             <mc:AlternateContent xmlns:mc="http://schemas.openxmlformats.org/markup-compatibility/2006">
               <mc:Choice xmlns:v="urn:schemas-microsoft-com:vml" Requires="v">
-                <p:oleObj spid="_x0000_s12293" name="Diapositiva think-cell" r:id="rId6" imgW="270" imgH="270" progId="TCLayout.ActiveDocument.1">
+                <p:oleObj spid="_x0000_s12294" name="Diapositiva think-cell" r:id="rId6" imgW="270" imgH="270" progId="TCLayout.ActiveDocument.1">
                   <p:embed/>
                 </p:oleObj>
               </mc:Choice>
@@ -9339,7 +9339,7 @@
           <p:cNvPr id="4" name="Rettangolo 3" hidden="1">
             <a:extLst>
               <a:ext uri="{FF2B5EF4-FFF2-40B4-BE49-F238E27FC236}">
-                <a16:creationId xmlns="" xmlns:a16="http://schemas.microsoft.com/office/drawing/2014/main" id="{62FA0B85-488D-4AE4-862F-D64B51F1802A}"/>
+                <a16:creationId xmlns:a16="http://schemas.microsoft.com/office/drawing/2014/main" xmlns="" id="{62FA0B85-488D-4AE4-862F-D64B51F1802A}"/>
               </a:ext>
             </a:extLst>
           </p:cNvPr>
@@ -9861,7 +9861,7 @@
           <p:cNvPr id="2" name="Oggetto 1" hidden="1">
             <a:extLst>
               <a:ext uri="{FF2B5EF4-FFF2-40B4-BE49-F238E27FC236}">
-                <a16:creationId xmlns="" xmlns:a16="http://schemas.microsoft.com/office/drawing/2014/main" id="{4D1C2F66-66AE-480C-88C5-6432EFBA8B5C}"/>
+                <a16:creationId xmlns:a16="http://schemas.microsoft.com/office/drawing/2014/main" xmlns="" id="{4D1C2F66-66AE-480C-88C5-6432EFBA8B5C}"/>
               </a:ext>
             </a:extLst>
           </p:cNvPr>
@@ -9887,7 +9887,7 @@
           <a:graphicData uri="http://schemas.openxmlformats.org/presentationml/2006/ole">
             <mc:AlternateContent xmlns:mc="http://schemas.openxmlformats.org/markup-compatibility/2006">
               <mc:Choice xmlns:v="urn:schemas-microsoft-com:vml" Requires="v">
-                <p:oleObj spid="_x0000_s2053" name="Diapositiva think-cell" r:id="rId7" imgW="270" imgH="270" progId="TCLayout.ActiveDocument.1">
+                <p:oleObj spid="_x0000_s2054" name="Diapositiva think-cell" r:id="rId7" imgW="270" imgH="270" progId="TCLayout.ActiveDocument.1">
                   <p:embed/>
                 </p:oleObj>
               </mc:Choice>
@@ -10299,7 +10299,7 @@
           <a:graphicData uri="http://schemas.openxmlformats.org/presentationml/2006/ole">
             <mc:AlternateContent xmlns:mc="http://schemas.openxmlformats.org/markup-compatibility/2006">
               <mc:Choice xmlns:v="urn:schemas-microsoft-com:vml" Requires="v">
-                <p:oleObj spid="_x0000_s3077" name="Diapositiva think-cell" r:id="rId16" imgW="270" imgH="270" progId="TCLayout.ActiveDocument.1">
+                <p:oleObj spid="_x0000_s3078" name="Diapositiva think-cell" r:id="rId16" imgW="270" imgH="270" progId="TCLayout.ActiveDocument.1">
                   <p:embed/>
                 </p:oleObj>
               </mc:Choice>
@@ -10783,7 +10783,7 @@
           <p:cNvPr id="4" name="Oggetto 3" hidden="1">
             <a:extLst>
               <a:ext uri="{FF2B5EF4-FFF2-40B4-BE49-F238E27FC236}">
-                <a16:creationId xmlns="" xmlns:a16="http://schemas.microsoft.com/office/drawing/2014/main" id="{7B0C7B7E-F192-4DDB-A370-11C614CB6C01}"/>
+                <a16:creationId xmlns:a16="http://schemas.microsoft.com/office/drawing/2014/main" xmlns="" id="{7B0C7B7E-F192-4DDB-A370-11C614CB6C01}"/>
               </a:ext>
             </a:extLst>
           </p:cNvPr>
@@ -10809,7 +10809,7 @@
           <a:graphicData uri="http://schemas.openxmlformats.org/presentationml/2006/ole">
             <mc:AlternateContent xmlns:mc="http://schemas.openxmlformats.org/markup-compatibility/2006">
               <mc:Choice xmlns:v="urn:schemas-microsoft-com:vml" Requires="v">
-                <p:oleObj spid="_x0000_s6149" name="Diapositiva think-cell" r:id="rId6" imgW="270" imgH="270" progId="TCLayout.ActiveDocument.1">
+                <p:oleObj spid="_x0000_s6150" name="Diapositiva think-cell" r:id="rId6" imgW="270" imgH="270" progId="TCLayout.ActiveDocument.1">
                   <p:embed/>
                 </p:oleObj>
               </mc:Choice>
@@ -10849,7 +10849,7 @@
           <p:cNvPr id="3" name="Rettangolo 2" hidden="1">
             <a:extLst>
               <a:ext uri="{FF2B5EF4-FFF2-40B4-BE49-F238E27FC236}">
-                <a16:creationId xmlns="" xmlns:a16="http://schemas.microsoft.com/office/drawing/2014/main" id="{59BA6DC0-A791-4D09-8A83-9C21E33E28AA}"/>
+                <a16:creationId xmlns:a16="http://schemas.microsoft.com/office/drawing/2014/main" xmlns="" id="{59BA6DC0-A791-4D09-8A83-9C21E33E28AA}"/>
               </a:ext>
             </a:extLst>
           </p:cNvPr>
@@ -11558,7 +11558,7 @@
           <p:cNvPr id="5" name="Oggetto 4" hidden="1">
             <a:extLst>
               <a:ext uri="{FF2B5EF4-FFF2-40B4-BE49-F238E27FC236}">
-                <a16:creationId xmlns="" xmlns:a16="http://schemas.microsoft.com/office/drawing/2014/main" id="{1757F136-FA5A-4D88-80E6-1F8CE6FF3418}"/>
+                <a16:creationId xmlns:a16="http://schemas.microsoft.com/office/drawing/2014/main" xmlns="" id="{1757F136-FA5A-4D88-80E6-1F8CE6FF3418}"/>
               </a:ext>
             </a:extLst>
           </p:cNvPr>
@@ -11584,7 +11584,7 @@
           <a:graphicData uri="http://schemas.openxmlformats.org/presentationml/2006/ole">
             <mc:AlternateContent xmlns:mc="http://schemas.openxmlformats.org/markup-compatibility/2006">
               <mc:Choice xmlns:v="urn:schemas-microsoft-com:vml" Requires="v">
-                <p:oleObj spid="_x0000_s7173" name="Diapositiva think-cell" r:id="rId6" imgW="270" imgH="270" progId="TCLayout.ActiveDocument.1">
+                <p:oleObj spid="_x0000_s7174" name="Diapositiva think-cell" r:id="rId6" imgW="270" imgH="270" progId="TCLayout.ActiveDocument.1">
                   <p:embed/>
                 </p:oleObj>
               </mc:Choice>
@@ -11624,7 +11624,7 @@
           <p:cNvPr id="4" name="Rettangolo 3" hidden="1">
             <a:extLst>
               <a:ext uri="{FF2B5EF4-FFF2-40B4-BE49-F238E27FC236}">
-                <a16:creationId xmlns="" xmlns:a16="http://schemas.microsoft.com/office/drawing/2014/main" id="{A85F65EE-61EA-4DBF-83E0-BF0ADD626DC3}"/>
+                <a16:creationId xmlns:a16="http://schemas.microsoft.com/office/drawing/2014/main" xmlns="" id="{A85F65EE-61EA-4DBF-83E0-BF0ADD626DC3}"/>
               </a:ext>
             </a:extLst>
           </p:cNvPr>
@@ -12429,7 +12429,7 @@
           <p:cNvPr id="4" name="Oggetto 3" hidden="1">
             <a:extLst>
               <a:ext uri="{FF2B5EF4-FFF2-40B4-BE49-F238E27FC236}">
-                <a16:creationId xmlns="" xmlns:a16="http://schemas.microsoft.com/office/drawing/2014/main" id="{77CBD9E6-2CE6-43C7-9999-674C4D1288AA}"/>
+                <a16:creationId xmlns:a16="http://schemas.microsoft.com/office/drawing/2014/main" xmlns="" id="{77CBD9E6-2CE6-43C7-9999-674C4D1288AA}"/>
               </a:ext>
             </a:extLst>
           </p:cNvPr>
@@ -12455,7 +12455,7 @@
           <a:graphicData uri="http://schemas.openxmlformats.org/presentationml/2006/ole">
             <mc:AlternateContent xmlns:mc="http://schemas.openxmlformats.org/markup-compatibility/2006">
               <mc:Choice xmlns:v="urn:schemas-microsoft-com:vml" Requires="v">
-                <p:oleObj spid="_x0000_s8197" name="Diapositiva think-cell" r:id="rId6" imgW="270" imgH="270" progId="TCLayout.ActiveDocument.1">
+                <p:oleObj spid="_x0000_s8198" name="Diapositiva think-cell" r:id="rId6" imgW="270" imgH="270" progId="TCLayout.ActiveDocument.1">
                   <p:embed/>
                 </p:oleObj>
               </mc:Choice>
@@ -12495,7 +12495,7 @@
           <p:cNvPr id="3" name="Rettangolo 2" hidden="1">
             <a:extLst>
               <a:ext uri="{FF2B5EF4-FFF2-40B4-BE49-F238E27FC236}">
-                <a16:creationId xmlns="" xmlns:a16="http://schemas.microsoft.com/office/drawing/2014/main" id="{A6980AB4-ECF4-48D4-88C2-C06EAD44374D}"/>
+                <a16:creationId xmlns:a16="http://schemas.microsoft.com/office/drawing/2014/main" xmlns="" id="{A6980AB4-ECF4-48D4-88C2-C06EAD44374D}"/>
               </a:ext>
             </a:extLst>
           </p:cNvPr>
@@ -13274,7 +13274,7 @@
           <a:graphicData uri="http://schemas.openxmlformats.org/presentationml/2006/ole">
             <mc:AlternateContent xmlns:mc="http://schemas.openxmlformats.org/markup-compatibility/2006">
               <mc:Choice xmlns:v="urn:schemas-microsoft-com:vml" Requires="v">
-                <p:oleObj spid="_x0000_s9221" name="Diapositiva think-cell" r:id="rId5" imgW="216" imgH="216" progId="TCLayout.ActiveDocument.1">
+                <p:oleObj spid="_x0000_s9222" name="Diapositiva think-cell" r:id="rId5" imgW="216" imgH="216" progId="TCLayout.ActiveDocument.1">
                   <p:embed/>
                 </p:oleObj>
               </mc:Choice>
@@ -13314,7 +13314,7 @@
           <p:cNvPr id="4" name="Rettangolo 3" hidden="1">
             <a:extLst>
               <a:ext uri="{FF2B5EF4-FFF2-40B4-BE49-F238E27FC236}">
-                <a16:creationId xmlns="" xmlns:a16="http://schemas.microsoft.com/office/drawing/2014/main" id="{B8E84D0A-0DF2-4492-953F-C944F7C598A7}"/>
+                <a16:creationId xmlns:a16="http://schemas.microsoft.com/office/drawing/2014/main" xmlns="" id="{B8E84D0A-0DF2-4492-953F-C944F7C598A7}"/>
               </a:ext>
             </a:extLst>
           </p:cNvPr>
@@ -13896,7 +13896,7 @@
           <p:cNvPr id="4" name="Oggetto 3" hidden="1">
             <a:extLst>
               <a:ext uri="{FF2B5EF4-FFF2-40B4-BE49-F238E27FC236}">
-                <a16:creationId xmlns="" xmlns:a16="http://schemas.microsoft.com/office/drawing/2014/main" id="{08B70646-CBD9-44F3-A0E6-415A68C25240}"/>
+                <a16:creationId xmlns:a16="http://schemas.microsoft.com/office/drawing/2014/main" xmlns="" id="{08B70646-CBD9-44F3-A0E6-415A68C25240}"/>
               </a:ext>
             </a:extLst>
           </p:cNvPr>
@@ -13922,7 +13922,7 @@
           <a:graphicData uri="http://schemas.openxmlformats.org/presentationml/2006/ole">
             <mc:AlternateContent xmlns:mc="http://schemas.openxmlformats.org/markup-compatibility/2006">
               <mc:Choice xmlns:v="urn:schemas-microsoft-com:vml" Requires="v">
-                <p:oleObj spid="_x0000_s10245" name="Diapositiva think-cell" r:id="rId6" imgW="270" imgH="270" progId="TCLayout.ActiveDocument.1">
+                <p:oleObj spid="_x0000_s10246" name="Diapositiva think-cell" r:id="rId6" imgW="270" imgH="270" progId="TCLayout.ActiveDocument.1">
                   <p:embed/>
                 </p:oleObj>
               </mc:Choice>
@@ -13962,7 +13962,7 @@
           <p:cNvPr id="3" name="Rettangolo 2" hidden="1">
             <a:extLst>
               <a:ext uri="{FF2B5EF4-FFF2-40B4-BE49-F238E27FC236}">
-                <a16:creationId xmlns="" xmlns:a16="http://schemas.microsoft.com/office/drawing/2014/main" id="{EF1716FB-0984-41E0-ABE5-1412DA28DF33}"/>
+                <a16:creationId xmlns:a16="http://schemas.microsoft.com/office/drawing/2014/main" xmlns="" id="{EF1716FB-0984-41E0-ABE5-1412DA28DF33}"/>
               </a:ext>
             </a:extLst>
           </p:cNvPr>
@@ -14713,7 +14713,7 @@
           <a:graphicData uri="http://schemas.openxmlformats.org/presentationml/2006/ole">
             <mc:AlternateContent xmlns:mc="http://schemas.openxmlformats.org/markup-compatibility/2006">
               <mc:Choice xmlns:v="urn:schemas-microsoft-com:vml" Requires="v">
-                <p:oleObj spid="_x0000_s11269" name="Diapositiva think-cell" r:id="rId5" imgW="216" imgH="216" progId="TCLayout.ActiveDocument.1">
+                <p:oleObj spid="_x0000_s11270" name="Diapositiva think-cell" r:id="rId5" imgW="216" imgH="216" progId="TCLayout.ActiveDocument.1">
                   <p:embed/>
                 </p:oleObj>
               </mc:Choice>
@@ -14753,7 +14753,7 @@
           <p:cNvPr id="5" name="Rettangolo 4" hidden="1">
             <a:extLst>
               <a:ext uri="{FF2B5EF4-FFF2-40B4-BE49-F238E27FC236}">
-                <a16:creationId xmlns="" xmlns:a16="http://schemas.microsoft.com/office/drawing/2014/main" id="{70F06448-8C35-431F-878F-42CCA4A1FB39}"/>
+                <a16:creationId xmlns:a16="http://schemas.microsoft.com/office/drawing/2014/main" xmlns="" id="{70F06448-8C35-431F-878F-42CCA4A1FB39}"/>
               </a:ext>
             </a:extLst>
           </p:cNvPr>
@@ -15428,7 +15428,7 @@
           <a:graphicData uri="http://schemas.openxmlformats.org/presentationml/2006/ole">
             <mc:AlternateContent xmlns:mc="http://schemas.openxmlformats.org/markup-compatibility/2006">
               <mc:Choice xmlns:v="urn:schemas-microsoft-com:vml" Requires="v">
-                <p:oleObj spid="_x0000_s14341" name="Diapositiva think-cell" r:id="rId4" imgW="270" imgH="270" progId="TCLayout.ActiveDocument.1">
+                <p:oleObj spid="_x0000_s14342" name="Diapositiva think-cell" r:id="rId4" imgW="270" imgH="270" progId="TCLayout.ActiveDocument.1">
                   <p:embed/>
                 </p:oleObj>
               </mc:Choice>
@@ -15468,7 +15468,7 @@
           <p:cNvPr id="6" name="Picture 5">
             <a:extLst>
               <a:ext uri="{FF2B5EF4-FFF2-40B4-BE49-F238E27FC236}">
-                <a16:creationId xmlns="" xmlns:a16="http://schemas.microsoft.com/office/drawing/2014/main" id="{53D91E67-CAFC-D7D6-F019-7AD3237D1098}"/>
+                <a16:creationId xmlns:a16="http://schemas.microsoft.com/office/drawing/2014/main" xmlns="" id="{53D91E67-CAFC-D7D6-F019-7AD3237D1098}"/>
               </a:ext>
             </a:extLst>
           </p:cNvPr>
@@ -15504,7 +15504,7 @@
     <a:masterClrMapping/>
   </p:clrMapOvr>
   <mc:AlternateContent xmlns:mc="http://schemas.openxmlformats.org/markup-compatibility/2006">
-    <mc:Choice xmlns="" xmlns:p159="http://schemas.microsoft.com/office/powerpoint/2015/09/main" Requires="p159">
+    <mc:Choice xmlns:p159="http://schemas.microsoft.com/office/powerpoint/2015/09/main" xmlns="" Requires="p159">
       <p:transition>
         <p159:morph option="byObject"/>
       </p:transition>
@@ -15535,6 +15535,44 @@
           <a:chExt cx="0" cy="0"/>
         </a:xfrm>
       </p:grpSpPr>
+      <p:sp>
+        <p:nvSpPr>
+          <p:cNvPr id="2" name="TextBox 1"/>
+          <p:cNvSpPr txBox="1"/>
+          <p:nvPr/>
+        </p:nvSpPr>
+        <p:spPr>
+          <a:xfrm>
+            <a:off x="408214" y="462643"/>
+            <a:ext cx="9797143" cy="400110"/>
+          </a:xfrm>
+          <a:prstGeom prst="rect">
+            <a:avLst/>
+          </a:prstGeom>
+          <a:noFill/>
+        </p:spPr>
+        <p:txBody>
+          <a:bodyPr wrap="square" rtlCol="0">
+            <a:spAutoFit/>
+          </a:bodyPr>
+          <a:lstStyle/>
+          <a:p>
+            <a:r>
+              <a:rPr lang="it-IT" sz="2000" smtClean="0">
+                <a:solidFill>
+                  <a:schemeClr val="bg1"/>
+                </a:solidFill>
+              </a:rPr>
+              <a:t>Titolo</a:t>
+            </a:r>
+            <a:endParaRPr lang="en-GB" sz="2000" dirty="0">
+              <a:solidFill>
+                <a:schemeClr val="bg1"/>
+              </a:solidFill>
+            </a:endParaRPr>
+          </a:p>
+        </p:txBody>
+      </p:sp>
     </p:spTree>
     <p:extLst>
       <p:ext uri="{BB962C8B-B14F-4D97-AF65-F5344CB8AC3E}">

</xml_diff>